<commit_message>
Slide-Modified: Change the main branch
</commit_message>
<xml_diff>
--- a/GitTutorial.pptx
+++ b/GitTutorial.pptx
@@ -8,7 +8,7 @@
     <p:sldId id="256" r:id="rId2"/>
     <p:sldId id="258" r:id="rId3"/>
     <p:sldId id="259" r:id="rId4"/>
-    <p:sldId id="260" r:id="rId5"/>
+    <p:sldId id="271" r:id="rId5"/>
     <p:sldId id="261" r:id="rId6"/>
     <p:sldId id="262" r:id="rId7"/>
     <p:sldId id="263" r:id="rId8"/>
@@ -128,7 +128,7 @@
           <p14:sldIdLst>
             <p14:sldId id="258"/>
             <p14:sldId id="259"/>
-            <p14:sldId id="260"/>
+            <p14:sldId id="271"/>
           </p14:sldIdLst>
         </p14:section>
         <p14:section name="New Repository" id="{67FDE11D-5567-46A8-8DFD-D4FA82779F10}">
@@ -153,6 +153,9 @@
           </p14:sldIdLst>
         </p14:section>
       </p14:sectionLst>
+    </p:ext>
+    <p:ext uri="{EFAFB233-063F-42B5-8137-9DF3F51BA10A}">
+      <p15:sldGuideLst xmlns:p15="http://schemas.microsoft.com/office/powerpoint/2012/main"/>
     </p:ext>
   </p:extLst>
 </p:presentation>
@@ -307,7 +310,7 @@
           <a:p>
             <a:fld id="{A3EF3731-9522-4EB1-9841-D2E79EBFA0E7}" type="datetimeFigureOut">
               <a:rPr lang="fa-IR" smtClean="0"/>
-              <a:t>06/10/1442</a:t>
+              <a:t>09/10/1442</a:t>
             </a:fld>
             <a:endParaRPr lang="fa-IR"/>
           </a:p>
@@ -507,7 +510,7 @@
           <a:p>
             <a:fld id="{A3EF3731-9522-4EB1-9841-D2E79EBFA0E7}" type="datetimeFigureOut">
               <a:rPr lang="fa-IR" smtClean="0"/>
-              <a:t>06/10/1442</a:t>
+              <a:t>09/10/1442</a:t>
             </a:fld>
             <a:endParaRPr lang="fa-IR"/>
           </a:p>
@@ -717,7 +720,7 @@
           <a:p>
             <a:fld id="{A3EF3731-9522-4EB1-9841-D2E79EBFA0E7}" type="datetimeFigureOut">
               <a:rPr lang="fa-IR" smtClean="0"/>
-              <a:t>06/10/1442</a:t>
+              <a:t>09/10/1442</a:t>
             </a:fld>
             <a:endParaRPr lang="fa-IR"/>
           </a:p>
@@ -917,7 +920,7 @@
           <a:p>
             <a:fld id="{A3EF3731-9522-4EB1-9841-D2E79EBFA0E7}" type="datetimeFigureOut">
               <a:rPr lang="fa-IR" smtClean="0"/>
-              <a:t>06/10/1442</a:t>
+              <a:t>09/10/1442</a:t>
             </a:fld>
             <a:endParaRPr lang="fa-IR"/>
           </a:p>
@@ -1193,7 +1196,7 @@
           <a:p>
             <a:fld id="{A3EF3731-9522-4EB1-9841-D2E79EBFA0E7}" type="datetimeFigureOut">
               <a:rPr lang="fa-IR" smtClean="0"/>
-              <a:t>06/10/1442</a:t>
+              <a:t>09/10/1442</a:t>
             </a:fld>
             <a:endParaRPr lang="fa-IR"/>
           </a:p>
@@ -1461,7 +1464,7 @@
           <a:p>
             <a:fld id="{A3EF3731-9522-4EB1-9841-D2E79EBFA0E7}" type="datetimeFigureOut">
               <a:rPr lang="fa-IR" smtClean="0"/>
-              <a:t>06/10/1442</a:t>
+              <a:t>09/10/1442</a:t>
             </a:fld>
             <a:endParaRPr lang="fa-IR"/>
           </a:p>
@@ -1876,7 +1879,7 @@
           <a:p>
             <a:fld id="{A3EF3731-9522-4EB1-9841-D2E79EBFA0E7}" type="datetimeFigureOut">
               <a:rPr lang="fa-IR" smtClean="0"/>
-              <a:t>06/10/1442</a:t>
+              <a:t>09/10/1442</a:t>
             </a:fld>
             <a:endParaRPr lang="fa-IR"/>
           </a:p>
@@ -2018,7 +2021,7 @@
           <a:p>
             <a:fld id="{A3EF3731-9522-4EB1-9841-D2E79EBFA0E7}" type="datetimeFigureOut">
               <a:rPr lang="fa-IR" smtClean="0"/>
-              <a:t>06/10/1442</a:t>
+              <a:t>09/10/1442</a:t>
             </a:fld>
             <a:endParaRPr lang="fa-IR"/>
           </a:p>
@@ -2131,7 +2134,7 @@
           <a:p>
             <a:fld id="{A3EF3731-9522-4EB1-9841-D2E79EBFA0E7}" type="datetimeFigureOut">
               <a:rPr lang="fa-IR" smtClean="0"/>
-              <a:t>06/10/1442</a:t>
+              <a:t>09/10/1442</a:t>
             </a:fld>
             <a:endParaRPr lang="fa-IR"/>
           </a:p>
@@ -2444,7 +2447,7 @@
           <a:p>
             <a:fld id="{A3EF3731-9522-4EB1-9841-D2E79EBFA0E7}" type="datetimeFigureOut">
               <a:rPr lang="fa-IR" smtClean="0"/>
-              <a:t>06/10/1442</a:t>
+              <a:t>09/10/1442</a:t>
             </a:fld>
             <a:endParaRPr lang="fa-IR"/>
           </a:p>
@@ -2733,7 +2736,7 @@
           <a:p>
             <a:fld id="{A3EF3731-9522-4EB1-9841-D2E79EBFA0E7}" type="datetimeFigureOut">
               <a:rPr lang="fa-IR" smtClean="0"/>
-              <a:t>06/10/1442</a:t>
+              <a:t>09/10/1442</a:t>
             </a:fld>
             <a:endParaRPr lang="fa-IR"/>
           </a:p>
@@ -2976,7 +2979,7 @@
           <a:p>
             <a:fld id="{A3EF3731-9522-4EB1-9841-D2E79EBFA0E7}" type="datetimeFigureOut">
               <a:rPr lang="fa-IR" smtClean="0"/>
-              <a:t>06/10/1442</a:t>
+              <a:t>09/10/1442</a:t>
             </a:fld>
             <a:endParaRPr lang="fa-IR"/>
           </a:p>
@@ -4404,61 +4407,888 @@
       </p:sp>
       <p:sp>
         <p:nvSpPr>
-          <p:cNvPr id="7" name="Content Placeholder 6">
-            <a:extLst>
-              <a:ext uri="{FF2B5EF4-FFF2-40B4-BE49-F238E27FC236}">
-                <a16:creationId xmlns:a16="http://schemas.microsoft.com/office/drawing/2014/main" id="{2545D441-F541-4F0A-AFA8-C4BB172A581F}"/>
-              </a:ext>
-            </a:extLst>
-          </p:cNvPr>
-          <p:cNvSpPr>
-            <a:spLocks noGrp="1"/>
-          </p:cNvSpPr>
-          <p:nvPr>
-            <p:ph idx="1"/>
-          </p:nvPr>
-        </p:nvSpPr>
-        <p:spPr/>
-        <p:txBody>
-          <a:bodyPr/>
-          <a:lstStyle/>
-          <a:p>
-            <a:r>
-              <a:rPr lang="en-US" dirty="0"/>
-              <a:t>From left panel select </a:t>
-            </a:r>
-            <a:r>
-              <a:rPr lang="en-US" b="1" dirty="0"/>
-              <a:t>Repositories</a:t>
-            </a:r>
-          </a:p>
-          <a:p>
-            <a:r>
-              <a:rPr lang="en-US" dirty="0"/>
-              <a:t>Change the default branch to </a:t>
-            </a:r>
-            <a:r>
-              <a:rPr lang="en-US" b="1" dirty="0"/>
-              <a:t>master</a:t>
-            </a:r>
-          </a:p>
-          <a:p>
-            <a:r>
-              <a:rPr lang="en-US" dirty="0"/>
-              <a:t>Push the upgrade button</a:t>
-            </a:r>
-          </a:p>
-          <a:p>
-            <a:endParaRPr lang="fa-IR" dirty="0"/>
-          </a:p>
-        </p:txBody>
-      </p:sp>
+          <p:cNvPr id="10" name="Block Arc 9">
+            <a:extLst>
+              <a:ext uri="{FF2B5EF4-FFF2-40B4-BE49-F238E27FC236}">
+                <a16:creationId xmlns:a16="http://schemas.microsoft.com/office/drawing/2014/main" id="{E32B4B3F-0EBB-4BCA-9FCC-28C199EB3DAB}"/>
+              </a:ext>
+            </a:extLst>
+          </p:cNvPr>
+          <p:cNvSpPr/>
+          <p:nvPr/>
+        </p:nvSpPr>
+        <p:spPr>
+          <a:xfrm>
+            <a:off x="-2727922" y="1545219"/>
+            <a:ext cx="3970761" cy="3970761"/>
+          </a:xfrm>
+          <a:prstGeom prst="blockArc">
+            <a:avLst>
+              <a:gd name="adj1" fmla="val 18900000"/>
+              <a:gd name="adj2" fmla="val 2700000"/>
+              <a:gd name="adj3" fmla="val 544"/>
+            </a:avLst>
+          </a:prstGeom>
+          <a:ln>
+            <a:solidFill>
+              <a:schemeClr val="accent1">
+                <a:lumMod val="75000"/>
+              </a:schemeClr>
+            </a:solidFill>
+          </a:ln>
+        </p:spPr>
+        <p:style>
+          <a:lnRef idx="2">
+            <a:schemeClr val="accent1">
+              <a:shade val="60000"/>
+              <a:hueOff val="0"/>
+              <a:satOff val="0"/>
+              <a:lumOff val="0"/>
+              <a:alphaOff val="0"/>
+            </a:schemeClr>
+          </a:lnRef>
+          <a:fillRef idx="0">
+            <a:schemeClr val="accent1">
+              <a:hueOff val="0"/>
+              <a:satOff val="0"/>
+              <a:lumOff val="0"/>
+              <a:alphaOff val="0"/>
+            </a:schemeClr>
+          </a:fillRef>
+          <a:effectRef idx="0">
+            <a:schemeClr val="accent1">
+              <a:hueOff val="0"/>
+              <a:satOff val="0"/>
+              <a:lumOff val="0"/>
+              <a:alphaOff val="0"/>
+            </a:schemeClr>
+          </a:effectRef>
+          <a:fontRef idx="minor">
+            <a:schemeClr val="tx1">
+              <a:hueOff val="0"/>
+              <a:satOff val="0"/>
+              <a:lumOff val="0"/>
+              <a:alphaOff val="0"/>
+            </a:schemeClr>
+          </a:fontRef>
+        </p:style>
+      </p:sp>
+      <p:grpSp>
+        <p:nvGrpSpPr>
+          <p:cNvPr id="22" name="Group 21">
+            <a:extLst>
+              <a:ext uri="{FF2B5EF4-FFF2-40B4-BE49-F238E27FC236}">
+                <a16:creationId xmlns:a16="http://schemas.microsoft.com/office/drawing/2014/main" id="{7133A007-EAF2-4EB2-9DD6-CE10315F47E2}"/>
+              </a:ext>
+            </a:extLst>
+          </p:cNvPr>
+          <p:cNvGrpSpPr/>
+          <p:nvPr/>
+        </p:nvGrpSpPr>
+        <p:grpSpPr>
+          <a:xfrm>
+            <a:off x="645766" y="2278379"/>
+            <a:ext cx="4682590" cy="736600"/>
+            <a:chOff x="5441549" y="2501335"/>
+            <a:chExt cx="4682590" cy="736600"/>
+          </a:xfrm>
+        </p:grpSpPr>
+        <p:sp>
+          <p:nvSpPr>
+            <p:cNvPr id="11" name="Freeform: Shape 10">
+              <a:extLst>
+                <a:ext uri="{FF2B5EF4-FFF2-40B4-BE49-F238E27FC236}">
+                  <a16:creationId xmlns:a16="http://schemas.microsoft.com/office/drawing/2014/main" id="{F72D9E4C-4065-446C-A536-0EE68C66869D}"/>
+                </a:ext>
+              </a:extLst>
+            </p:cNvPr>
+            <p:cNvSpPr/>
+            <p:nvPr/>
+          </p:nvSpPr>
+          <p:spPr>
+            <a:xfrm>
+              <a:off x="5809849" y="2574995"/>
+              <a:ext cx="4314290" cy="589280"/>
+            </a:xfrm>
+            <a:custGeom>
+              <a:avLst/>
+              <a:gdLst>
+                <a:gd name="connsiteX0" fmla="*/ 0 w 4314290"/>
+                <a:gd name="connsiteY0" fmla="*/ 0 h 589280"/>
+                <a:gd name="connsiteX1" fmla="*/ 4314290 w 4314290"/>
+                <a:gd name="connsiteY1" fmla="*/ 0 h 589280"/>
+                <a:gd name="connsiteX2" fmla="*/ 4314290 w 4314290"/>
+                <a:gd name="connsiteY2" fmla="*/ 589280 h 589280"/>
+                <a:gd name="connsiteX3" fmla="*/ 0 w 4314290"/>
+                <a:gd name="connsiteY3" fmla="*/ 589280 h 589280"/>
+                <a:gd name="connsiteX4" fmla="*/ 0 w 4314290"/>
+                <a:gd name="connsiteY4" fmla="*/ 0 h 589280"/>
+              </a:gdLst>
+              <a:ahLst/>
+              <a:cxnLst>
+                <a:cxn ang="0">
+                  <a:pos x="connsiteX0" y="connsiteY0"/>
+                </a:cxn>
+                <a:cxn ang="0">
+                  <a:pos x="connsiteX1" y="connsiteY1"/>
+                </a:cxn>
+                <a:cxn ang="0">
+                  <a:pos x="connsiteX2" y="connsiteY2"/>
+                </a:cxn>
+                <a:cxn ang="0">
+                  <a:pos x="connsiteX3" y="connsiteY3"/>
+                </a:cxn>
+                <a:cxn ang="0">
+                  <a:pos x="connsiteX4" y="connsiteY4"/>
+                </a:cxn>
+              </a:cxnLst>
+              <a:rect l="l" t="t" r="r" b="b"/>
+              <a:pathLst>
+                <a:path w="4314290" h="589280">
+                  <a:moveTo>
+                    <a:pt x="0" y="0"/>
+                  </a:moveTo>
+                  <a:lnTo>
+                    <a:pt x="4314290" y="0"/>
+                  </a:lnTo>
+                  <a:lnTo>
+                    <a:pt x="4314290" y="589280"/>
+                  </a:lnTo>
+                  <a:lnTo>
+                    <a:pt x="0" y="589280"/>
+                  </a:lnTo>
+                  <a:lnTo>
+                    <a:pt x="0" y="0"/>
+                  </a:lnTo>
+                  <a:close/>
+                </a:path>
+              </a:pathLst>
+            </a:custGeom>
+            <a:solidFill>
+              <a:schemeClr val="accent1">
+                <a:lumMod val="75000"/>
+              </a:schemeClr>
+            </a:solidFill>
+          </p:spPr>
+          <p:style>
+            <a:lnRef idx="2">
+              <a:schemeClr val="lt1">
+                <a:hueOff val="0"/>
+                <a:satOff val="0"/>
+                <a:lumOff val="0"/>
+                <a:alphaOff val="0"/>
+              </a:schemeClr>
+            </a:lnRef>
+            <a:fillRef idx="1">
+              <a:schemeClr val="accent1">
+                <a:hueOff val="0"/>
+                <a:satOff val="0"/>
+                <a:lumOff val="0"/>
+                <a:alphaOff val="0"/>
+              </a:schemeClr>
+            </a:fillRef>
+            <a:effectRef idx="0">
+              <a:schemeClr val="accent1">
+                <a:hueOff val="0"/>
+                <a:satOff val="0"/>
+                <a:lumOff val="0"/>
+                <a:alphaOff val="0"/>
+              </a:schemeClr>
+            </a:effectRef>
+            <a:fontRef idx="minor">
+              <a:schemeClr val="lt1"/>
+            </a:fontRef>
+          </p:style>
+          <p:txBody>
+            <a:bodyPr spcFirstLastPara="0" vert="horz" wrap="square" lIns="467741" tIns="45720" rIns="45720" bIns="45720" numCol="1" spcCol="1270" anchor="ctr" anchorCtr="0">
+              <a:noAutofit/>
+            </a:bodyPr>
+            <a:lstStyle/>
+            <a:p>
+              <a:pPr marL="0" lvl="0" indent="0" defTabSz="800100">
+                <a:lnSpc>
+                  <a:spcPct val="90000"/>
+                </a:lnSpc>
+                <a:spcBef>
+                  <a:spcPct val="0"/>
+                </a:spcBef>
+                <a:spcAft>
+                  <a:spcPct val="35000"/>
+                </a:spcAft>
+                <a:buNone/>
+              </a:pPr>
+              <a:r>
+                <a:rPr lang="en-US" sz="1800" kern="1200" dirty="0"/>
+                <a:t>From left panel select </a:t>
+              </a:r>
+              <a:r>
+                <a:rPr lang="en-US" sz="1800" b="1" kern="1200" dirty="0"/>
+                <a:t>Repositories</a:t>
+              </a:r>
+              <a:r>
+                <a:rPr lang="fa-IR" sz="1800" b="1" kern="1200" dirty="0"/>
+                <a:t> </a:t>
+              </a:r>
+              <a:endParaRPr lang="fa-IR" sz="1800" kern="1200" dirty="0"/>
+            </a:p>
+          </p:txBody>
+        </p:sp>
+        <p:sp>
+          <p:nvSpPr>
+            <p:cNvPr id="12" name="Oval 11">
+              <a:extLst>
+                <a:ext uri="{FF2B5EF4-FFF2-40B4-BE49-F238E27FC236}">
+                  <a16:creationId xmlns:a16="http://schemas.microsoft.com/office/drawing/2014/main" id="{3E2D700C-8F62-4197-990C-125B229EDB79}"/>
+                </a:ext>
+              </a:extLst>
+            </p:cNvPr>
+            <p:cNvSpPr/>
+            <p:nvPr/>
+          </p:nvSpPr>
+          <p:spPr>
+            <a:xfrm>
+              <a:off x="5441549" y="2501335"/>
+              <a:ext cx="736600" cy="736600"/>
+            </a:xfrm>
+            <a:prstGeom prst="ellipse">
+              <a:avLst/>
+            </a:prstGeom>
+            <a:ln>
+              <a:solidFill>
+                <a:schemeClr val="accent1">
+                  <a:lumMod val="75000"/>
+                </a:schemeClr>
+              </a:solidFill>
+            </a:ln>
+          </p:spPr>
+          <p:style>
+            <a:lnRef idx="2">
+              <a:schemeClr val="accent1">
+                <a:hueOff val="0"/>
+                <a:satOff val="0"/>
+                <a:lumOff val="0"/>
+                <a:alphaOff val="0"/>
+              </a:schemeClr>
+            </a:lnRef>
+            <a:fillRef idx="1">
+              <a:schemeClr val="lt1">
+                <a:hueOff val="0"/>
+                <a:satOff val="0"/>
+                <a:lumOff val="0"/>
+                <a:alphaOff val="0"/>
+              </a:schemeClr>
+            </a:fillRef>
+            <a:effectRef idx="0">
+              <a:schemeClr val="lt1">
+                <a:hueOff val="0"/>
+                <a:satOff val="0"/>
+                <a:lumOff val="0"/>
+                <a:alphaOff val="0"/>
+              </a:schemeClr>
+            </a:effectRef>
+            <a:fontRef idx="minor">
+              <a:schemeClr val="dk1">
+                <a:hueOff val="0"/>
+                <a:satOff val="0"/>
+                <a:lumOff val="0"/>
+                <a:alphaOff val="0"/>
+              </a:schemeClr>
+            </a:fontRef>
+          </p:style>
+        </p:sp>
+        <p:sp>
+          <p:nvSpPr>
+            <p:cNvPr id="18" name="TextBox 17">
+              <a:extLst>
+                <a:ext uri="{FF2B5EF4-FFF2-40B4-BE49-F238E27FC236}">
+                  <a16:creationId xmlns:a16="http://schemas.microsoft.com/office/drawing/2014/main" id="{B1537222-0EA6-4554-812D-05CDB49ED178}"/>
+                </a:ext>
+              </a:extLst>
+            </p:cNvPr>
+            <p:cNvSpPr txBox="1"/>
+            <p:nvPr/>
+          </p:nvSpPr>
+          <p:spPr>
+            <a:xfrm>
+              <a:off x="5586588" y="2588126"/>
+              <a:ext cx="434734" cy="584775"/>
+            </a:xfrm>
+            <a:prstGeom prst="rect">
+              <a:avLst/>
+            </a:prstGeom>
+            <a:noFill/>
+          </p:spPr>
+          <p:txBody>
+            <a:bodyPr wrap="none" rtlCol="1">
+              <a:spAutoFit/>
+            </a:bodyPr>
+            <a:lstStyle/>
+            <a:p>
+              <a:r>
+                <a:rPr lang="en-US" sz="3200" dirty="0">
+                  <a:solidFill>
+                    <a:schemeClr val="bg2">
+                      <a:lumMod val="50000"/>
+                    </a:schemeClr>
+                  </a:solidFill>
+                  <a:latin typeface="Britannic Bold" panose="020B0903060703020204" pitchFamily="34" charset="0"/>
+                </a:rPr>
+                <a:t>1</a:t>
+              </a:r>
+              <a:endParaRPr lang="fa-IR" sz="3200" dirty="0">
+                <a:solidFill>
+                  <a:schemeClr val="bg2">
+                    <a:lumMod val="50000"/>
+                  </a:schemeClr>
+                </a:solidFill>
+                <a:latin typeface="Britannic Bold" panose="020B0903060703020204" pitchFamily="34" charset="0"/>
+              </a:endParaRPr>
+            </a:p>
+          </p:txBody>
+        </p:sp>
+      </p:grpSp>
+      <p:grpSp>
+        <p:nvGrpSpPr>
+          <p:cNvPr id="23" name="Group 22">
+            <a:extLst>
+              <a:ext uri="{FF2B5EF4-FFF2-40B4-BE49-F238E27FC236}">
+                <a16:creationId xmlns:a16="http://schemas.microsoft.com/office/drawing/2014/main" id="{7FE18F92-8FA2-4AB7-9770-4EFBF33A7CD7}"/>
+              </a:ext>
+            </a:extLst>
+          </p:cNvPr>
+          <p:cNvGrpSpPr/>
+          <p:nvPr/>
+        </p:nvGrpSpPr>
+        <p:grpSpPr>
+          <a:xfrm>
+            <a:off x="859969" y="3162299"/>
+            <a:ext cx="4468387" cy="736600"/>
+            <a:chOff x="5655752" y="3385255"/>
+            <a:chExt cx="4468387" cy="736600"/>
+          </a:xfrm>
+        </p:grpSpPr>
+        <p:sp>
+          <p:nvSpPr>
+            <p:cNvPr id="13" name="Freeform: Shape 12">
+              <a:extLst>
+                <a:ext uri="{FF2B5EF4-FFF2-40B4-BE49-F238E27FC236}">
+                  <a16:creationId xmlns:a16="http://schemas.microsoft.com/office/drawing/2014/main" id="{54150796-5A67-484F-8D2D-288FCB7FBF76}"/>
+                </a:ext>
+              </a:extLst>
+            </p:cNvPr>
+            <p:cNvSpPr/>
+            <p:nvPr/>
+          </p:nvSpPr>
+          <p:spPr>
+            <a:xfrm>
+              <a:off x="6024052" y="3458915"/>
+              <a:ext cx="4100087" cy="589280"/>
+            </a:xfrm>
+            <a:custGeom>
+              <a:avLst/>
+              <a:gdLst>
+                <a:gd name="connsiteX0" fmla="*/ 0 w 4100087"/>
+                <a:gd name="connsiteY0" fmla="*/ 0 h 589280"/>
+                <a:gd name="connsiteX1" fmla="*/ 4100087 w 4100087"/>
+                <a:gd name="connsiteY1" fmla="*/ 0 h 589280"/>
+                <a:gd name="connsiteX2" fmla="*/ 4100087 w 4100087"/>
+                <a:gd name="connsiteY2" fmla="*/ 589280 h 589280"/>
+                <a:gd name="connsiteX3" fmla="*/ 0 w 4100087"/>
+                <a:gd name="connsiteY3" fmla="*/ 589280 h 589280"/>
+                <a:gd name="connsiteX4" fmla="*/ 0 w 4100087"/>
+                <a:gd name="connsiteY4" fmla="*/ 0 h 589280"/>
+              </a:gdLst>
+              <a:ahLst/>
+              <a:cxnLst>
+                <a:cxn ang="0">
+                  <a:pos x="connsiteX0" y="connsiteY0"/>
+                </a:cxn>
+                <a:cxn ang="0">
+                  <a:pos x="connsiteX1" y="connsiteY1"/>
+                </a:cxn>
+                <a:cxn ang="0">
+                  <a:pos x="connsiteX2" y="connsiteY2"/>
+                </a:cxn>
+                <a:cxn ang="0">
+                  <a:pos x="connsiteX3" y="connsiteY3"/>
+                </a:cxn>
+                <a:cxn ang="0">
+                  <a:pos x="connsiteX4" y="connsiteY4"/>
+                </a:cxn>
+              </a:cxnLst>
+              <a:rect l="l" t="t" r="r" b="b"/>
+              <a:pathLst>
+                <a:path w="4100087" h="589280">
+                  <a:moveTo>
+                    <a:pt x="0" y="0"/>
+                  </a:moveTo>
+                  <a:lnTo>
+                    <a:pt x="4100087" y="0"/>
+                  </a:lnTo>
+                  <a:lnTo>
+                    <a:pt x="4100087" y="589280"/>
+                  </a:lnTo>
+                  <a:lnTo>
+                    <a:pt x="0" y="589280"/>
+                  </a:lnTo>
+                  <a:lnTo>
+                    <a:pt x="0" y="0"/>
+                  </a:lnTo>
+                  <a:close/>
+                </a:path>
+              </a:pathLst>
+            </a:custGeom>
+            <a:solidFill>
+              <a:schemeClr val="accent1">
+                <a:lumMod val="75000"/>
+              </a:schemeClr>
+            </a:solidFill>
+          </p:spPr>
+          <p:style>
+            <a:lnRef idx="2">
+              <a:schemeClr val="lt1">
+                <a:hueOff val="0"/>
+                <a:satOff val="0"/>
+                <a:lumOff val="0"/>
+                <a:alphaOff val="0"/>
+              </a:schemeClr>
+            </a:lnRef>
+            <a:fillRef idx="1">
+              <a:schemeClr val="accent1">
+                <a:hueOff val="0"/>
+                <a:satOff val="0"/>
+                <a:lumOff val="0"/>
+                <a:alphaOff val="0"/>
+              </a:schemeClr>
+            </a:fillRef>
+            <a:effectRef idx="0">
+              <a:schemeClr val="accent1">
+                <a:hueOff val="0"/>
+                <a:satOff val="0"/>
+                <a:lumOff val="0"/>
+                <a:alphaOff val="0"/>
+              </a:schemeClr>
+            </a:effectRef>
+            <a:fontRef idx="minor">
+              <a:schemeClr val="lt1"/>
+            </a:fontRef>
+          </p:style>
+          <p:txBody>
+            <a:bodyPr spcFirstLastPara="0" vert="horz" wrap="square" lIns="467741" tIns="45720" rIns="45720" bIns="45720" numCol="1" spcCol="1270" anchor="ctr" anchorCtr="0">
+              <a:noAutofit/>
+            </a:bodyPr>
+            <a:lstStyle/>
+            <a:p>
+              <a:pPr marL="0" lvl="0" indent="0" defTabSz="800100">
+                <a:lnSpc>
+                  <a:spcPct val="90000"/>
+                </a:lnSpc>
+                <a:spcBef>
+                  <a:spcPct val="0"/>
+                </a:spcBef>
+                <a:spcAft>
+                  <a:spcPct val="35000"/>
+                </a:spcAft>
+                <a:buNone/>
+              </a:pPr>
+              <a:r>
+                <a:rPr lang="en-US" sz="1800" kern="1200" dirty="0"/>
+                <a:t>Change the default branch to </a:t>
+              </a:r>
+              <a:r>
+                <a:rPr lang="en-US" sz="1800" b="1" kern="1200" dirty="0"/>
+                <a:t>master</a:t>
+              </a:r>
+              <a:endParaRPr lang="fa-IR" sz="1800" kern="1200" dirty="0"/>
+            </a:p>
+          </p:txBody>
+        </p:sp>
+        <p:sp>
+          <p:nvSpPr>
+            <p:cNvPr id="14" name="Oval 13">
+              <a:extLst>
+                <a:ext uri="{FF2B5EF4-FFF2-40B4-BE49-F238E27FC236}">
+                  <a16:creationId xmlns:a16="http://schemas.microsoft.com/office/drawing/2014/main" id="{7F047843-37E7-45AF-AAC7-ABCEEA2B720C}"/>
+                </a:ext>
+              </a:extLst>
+            </p:cNvPr>
+            <p:cNvSpPr/>
+            <p:nvPr/>
+          </p:nvSpPr>
+          <p:spPr>
+            <a:xfrm>
+              <a:off x="5655752" y="3385255"/>
+              <a:ext cx="736600" cy="736600"/>
+            </a:xfrm>
+            <a:prstGeom prst="ellipse">
+              <a:avLst/>
+            </a:prstGeom>
+            <a:ln>
+              <a:solidFill>
+                <a:schemeClr val="accent1">
+                  <a:lumMod val="75000"/>
+                </a:schemeClr>
+              </a:solidFill>
+            </a:ln>
+          </p:spPr>
+          <p:style>
+            <a:lnRef idx="2">
+              <a:schemeClr val="accent1">
+                <a:hueOff val="0"/>
+                <a:satOff val="0"/>
+                <a:lumOff val="0"/>
+                <a:alphaOff val="0"/>
+              </a:schemeClr>
+            </a:lnRef>
+            <a:fillRef idx="1">
+              <a:schemeClr val="lt1">
+                <a:hueOff val="0"/>
+                <a:satOff val="0"/>
+                <a:lumOff val="0"/>
+                <a:alphaOff val="0"/>
+              </a:schemeClr>
+            </a:fillRef>
+            <a:effectRef idx="0">
+              <a:schemeClr val="lt1">
+                <a:hueOff val="0"/>
+                <a:satOff val="0"/>
+                <a:lumOff val="0"/>
+                <a:alphaOff val="0"/>
+              </a:schemeClr>
+            </a:effectRef>
+            <a:fontRef idx="minor">
+              <a:schemeClr val="dk1">
+                <a:hueOff val="0"/>
+                <a:satOff val="0"/>
+                <a:lumOff val="0"/>
+                <a:alphaOff val="0"/>
+              </a:schemeClr>
+            </a:fontRef>
+          </p:style>
+        </p:sp>
+        <p:sp>
+          <p:nvSpPr>
+            <p:cNvPr id="20" name="TextBox 19">
+              <a:extLst>
+                <a:ext uri="{FF2B5EF4-FFF2-40B4-BE49-F238E27FC236}">
+                  <a16:creationId xmlns:a16="http://schemas.microsoft.com/office/drawing/2014/main" id="{2C083E7B-FF5A-41F5-B560-8B84C8860FA2}"/>
+                </a:ext>
+              </a:extLst>
+            </p:cNvPr>
+            <p:cNvSpPr txBox="1"/>
+            <p:nvPr/>
+          </p:nvSpPr>
+          <p:spPr>
+            <a:xfrm>
+              <a:off x="5821255" y="3429000"/>
+              <a:ext cx="434734" cy="584775"/>
+            </a:xfrm>
+            <a:prstGeom prst="rect">
+              <a:avLst/>
+            </a:prstGeom>
+            <a:noFill/>
+          </p:spPr>
+          <p:txBody>
+            <a:bodyPr wrap="none" rtlCol="1">
+              <a:spAutoFit/>
+            </a:bodyPr>
+            <a:lstStyle/>
+            <a:p>
+              <a:r>
+                <a:rPr lang="en-US" sz="3200" dirty="0">
+                  <a:solidFill>
+                    <a:schemeClr val="bg2">
+                      <a:lumMod val="50000"/>
+                    </a:schemeClr>
+                  </a:solidFill>
+                  <a:latin typeface="Britannic Bold" panose="020B0903060703020204" pitchFamily="34" charset="0"/>
+                </a:rPr>
+                <a:t>2</a:t>
+              </a:r>
+              <a:endParaRPr lang="fa-IR" sz="3200" dirty="0">
+                <a:solidFill>
+                  <a:schemeClr val="bg2">
+                    <a:lumMod val="50000"/>
+                  </a:schemeClr>
+                </a:solidFill>
+                <a:latin typeface="Britannic Bold" panose="020B0903060703020204" pitchFamily="34" charset="0"/>
+              </a:endParaRPr>
+            </a:p>
+          </p:txBody>
+        </p:sp>
+      </p:grpSp>
+      <p:grpSp>
+        <p:nvGrpSpPr>
+          <p:cNvPr id="24" name="Group 23">
+            <a:extLst>
+              <a:ext uri="{FF2B5EF4-FFF2-40B4-BE49-F238E27FC236}">
+                <a16:creationId xmlns:a16="http://schemas.microsoft.com/office/drawing/2014/main" id="{BF4E3E70-CAE2-4B7E-9863-CE310C8463E1}"/>
+              </a:ext>
+            </a:extLst>
+          </p:cNvPr>
+          <p:cNvGrpSpPr/>
+          <p:nvPr/>
+        </p:nvGrpSpPr>
+        <p:grpSpPr>
+          <a:xfrm>
+            <a:off x="645766" y="4046219"/>
+            <a:ext cx="4682590" cy="736600"/>
+            <a:chOff x="5441549" y="4269175"/>
+            <a:chExt cx="4682590" cy="736600"/>
+          </a:xfrm>
+        </p:grpSpPr>
+        <p:sp>
+          <p:nvSpPr>
+            <p:cNvPr id="15" name="Freeform: Shape 14">
+              <a:extLst>
+                <a:ext uri="{FF2B5EF4-FFF2-40B4-BE49-F238E27FC236}">
+                  <a16:creationId xmlns:a16="http://schemas.microsoft.com/office/drawing/2014/main" id="{FE8C3F3F-83E7-4201-B1FD-31CA9006ADD6}"/>
+                </a:ext>
+              </a:extLst>
+            </p:cNvPr>
+            <p:cNvSpPr/>
+            <p:nvPr/>
+          </p:nvSpPr>
+          <p:spPr>
+            <a:xfrm>
+              <a:off x="5809849" y="4342835"/>
+              <a:ext cx="4314290" cy="589280"/>
+            </a:xfrm>
+            <a:custGeom>
+              <a:avLst/>
+              <a:gdLst>
+                <a:gd name="connsiteX0" fmla="*/ 0 w 4314290"/>
+                <a:gd name="connsiteY0" fmla="*/ 0 h 589280"/>
+                <a:gd name="connsiteX1" fmla="*/ 4314290 w 4314290"/>
+                <a:gd name="connsiteY1" fmla="*/ 0 h 589280"/>
+                <a:gd name="connsiteX2" fmla="*/ 4314290 w 4314290"/>
+                <a:gd name="connsiteY2" fmla="*/ 589280 h 589280"/>
+                <a:gd name="connsiteX3" fmla="*/ 0 w 4314290"/>
+                <a:gd name="connsiteY3" fmla="*/ 589280 h 589280"/>
+                <a:gd name="connsiteX4" fmla="*/ 0 w 4314290"/>
+                <a:gd name="connsiteY4" fmla="*/ 0 h 589280"/>
+              </a:gdLst>
+              <a:ahLst/>
+              <a:cxnLst>
+                <a:cxn ang="0">
+                  <a:pos x="connsiteX0" y="connsiteY0"/>
+                </a:cxn>
+                <a:cxn ang="0">
+                  <a:pos x="connsiteX1" y="connsiteY1"/>
+                </a:cxn>
+                <a:cxn ang="0">
+                  <a:pos x="connsiteX2" y="connsiteY2"/>
+                </a:cxn>
+                <a:cxn ang="0">
+                  <a:pos x="connsiteX3" y="connsiteY3"/>
+                </a:cxn>
+                <a:cxn ang="0">
+                  <a:pos x="connsiteX4" y="connsiteY4"/>
+                </a:cxn>
+              </a:cxnLst>
+              <a:rect l="l" t="t" r="r" b="b"/>
+              <a:pathLst>
+                <a:path w="4314290" h="589280">
+                  <a:moveTo>
+                    <a:pt x="0" y="0"/>
+                  </a:moveTo>
+                  <a:lnTo>
+                    <a:pt x="4314290" y="0"/>
+                  </a:lnTo>
+                  <a:lnTo>
+                    <a:pt x="4314290" y="589280"/>
+                  </a:lnTo>
+                  <a:lnTo>
+                    <a:pt x="0" y="589280"/>
+                  </a:lnTo>
+                  <a:lnTo>
+                    <a:pt x="0" y="0"/>
+                  </a:lnTo>
+                  <a:close/>
+                </a:path>
+              </a:pathLst>
+            </a:custGeom>
+            <a:solidFill>
+              <a:schemeClr val="accent1">
+                <a:lumMod val="75000"/>
+              </a:schemeClr>
+            </a:solidFill>
+          </p:spPr>
+          <p:style>
+            <a:lnRef idx="2">
+              <a:schemeClr val="lt1">
+                <a:hueOff val="0"/>
+                <a:satOff val="0"/>
+                <a:lumOff val="0"/>
+                <a:alphaOff val="0"/>
+              </a:schemeClr>
+            </a:lnRef>
+            <a:fillRef idx="1">
+              <a:schemeClr val="accent1">
+                <a:hueOff val="0"/>
+                <a:satOff val="0"/>
+                <a:lumOff val="0"/>
+                <a:alphaOff val="0"/>
+              </a:schemeClr>
+            </a:fillRef>
+            <a:effectRef idx="0">
+              <a:schemeClr val="accent1">
+                <a:hueOff val="0"/>
+                <a:satOff val="0"/>
+                <a:lumOff val="0"/>
+                <a:alphaOff val="0"/>
+              </a:schemeClr>
+            </a:effectRef>
+            <a:fontRef idx="minor">
+              <a:schemeClr val="lt1"/>
+            </a:fontRef>
+          </p:style>
+          <p:txBody>
+            <a:bodyPr spcFirstLastPara="0" vert="horz" wrap="square" lIns="467741" tIns="45720" rIns="45720" bIns="45720" numCol="1" spcCol="1270" anchor="ctr" anchorCtr="0">
+              <a:noAutofit/>
+            </a:bodyPr>
+            <a:lstStyle/>
+            <a:p>
+              <a:pPr marL="0" lvl="0" indent="0" defTabSz="800100">
+                <a:lnSpc>
+                  <a:spcPct val="90000"/>
+                </a:lnSpc>
+                <a:spcBef>
+                  <a:spcPct val="0"/>
+                </a:spcBef>
+                <a:spcAft>
+                  <a:spcPct val="35000"/>
+                </a:spcAft>
+                <a:buNone/>
+              </a:pPr>
+              <a:r>
+                <a:rPr lang="en-US" sz="1800" kern="1200"/>
+                <a:t>Push the upgrade button</a:t>
+              </a:r>
+              <a:endParaRPr lang="fa-IR" sz="1800" kern="1200"/>
+            </a:p>
+          </p:txBody>
+        </p:sp>
+        <p:sp>
+          <p:nvSpPr>
+            <p:cNvPr id="16" name="Oval 15">
+              <a:extLst>
+                <a:ext uri="{FF2B5EF4-FFF2-40B4-BE49-F238E27FC236}">
+                  <a16:creationId xmlns:a16="http://schemas.microsoft.com/office/drawing/2014/main" id="{3F49F63D-79D0-46FA-B288-D77C4570F302}"/>
+                </a:ext>
+              </a:extLst>
+            </p:cNvPr>
+            <p:cNvSpPr/>
+            <p:nvPr/>
+          </p:nvSpPr>
+          <p:spPr>
+            <a:xfrm>
+              <a:off x="5441549" y="4269175"/>
+              <a:ext cx="736600" cy="736600"/>
+            </a:xfrm>
+            <a:prstGeom prst="ellipse">
+              <a:avLst/>
+            </a:prstGeom>
+            <a:ln>
+              <a:solidFill>
+                <a:schemeClr val="accent1">
+                  <a:lumMod val="75000"/>
+                </a:schemeClr>
+              </a:solidFill>
+            </a:ln>
+          </p:spPr>
+          <p:style>
+            <a:lnRef idx="2">
+              <a:schemeClr val="accent1">
+                <a:hueOff val="0"/>
+                <a:satOff val="0"/>
+                <a:lumOff val="0"/>
+                <a:alphaOff val="0"/>
+              </a:schemeClr>
+            </a:lnRef>
+            <a:fillRef idx="1">
+              <a:schemeClr val="lt1">
+                <a:hueOff val="0"/>
+                <a:satOff val="0"/>
+                <a:lumOff val="0"/>
+                <a:alphaOff val="0"/>
+              </a:schemeClr>
+            </a:fillRef>
+            <a:effectRef idx="0">
+              <a:schemeClr val="lt1">
+                <a:hueOff val="0"/>
+                <a:satOff val="0"/>
+                <a:lumOff val="0"/>
+                <a:alphaOff val="0"/>
+              </a:schemeClr>
+            </a:effectRef>
+            <a:fontRef idx="minor">
+              <a:schemeClr val="dk1">
+                <a:hueOff val="0"/>
+                <a:satOff val="0"/>
+                <a:lumOff val="0"/>
+                <a:alphaOff val="0"/>
+              </a:schemeClr>
+            </a:fontRef>
+          </p:style>
+        </p:sp>
+        <p:sp>
+          <p:nvSpPr>
+            <p:cNvPr id="21" name="TextBox 20">
+              <a:extLst>
+                <a:ext uri="{FF2B5EF4-FFF2-40B4-BE49-F238E27FC236}">
+                  <a16:creationId xmlns:a16="http://schemas.microsoft.com/office/drawing/2014/main" id="{90D50E3A-9D22-4F5D-97EE-4F6C7161197E}"/>
+                </a:ext>
+              </a:extLst>
+            </p:cNvPr>
+            <p:cNvSpPr txBox="1"/>
+            <p:nvPr/>
+          </p:nvSpPr>
+          <p:spPr>
+            <a:xfrm>
+              <a:off x="5586588" y="4318617"/>
+              <a:ext cx="434734" cy="584775"/>
+            </a:xfrm>
+            <a:prstGeom prst="rect">
+              <a:avLst/>
+            </a:prstGeom>
+            <a:noFill/>
+          </p:spPr>
+          <p:txBody>
+            <a:bodyPr wrap="square" rtlCol="1">
+              <a:spAutoFit/>
+            </a:bodyPr>
+            <a:lstStyle/>
+            <a:p>
+              <a:r>
+                <a:rPr lang="en-US" sz="3200" dirty="0">
+                  <a:solidFill>
+                    <a:schemeClr val="bg2">
+                      <a:lumMod val="50000"/>
+                    </a:schemeClr>
+                  </a:solidFill>
+                  <a:latin typeface="Britannic Bold" panose="020B0903060703020204" pitchFamily="34" charset="0"/>
+                </a:rPr>
+                <a:t>3</a:t>
+              </a:r>
+              <a:endParaRPr lang="fa-IR" sz="3200" dirty="0">
+                <a:solidFill>
+                  <a:schemeClr val="bg2">
+                    <a:lumMod val="50000"/>
+                  </a:schemeClr>
+                </a:solidFill>
+                <a:latin typeface="Britannic Bold" panose="020B0903060703020204" pitchFamily="34" charset="0"/>
+              </a:endParaRPr>
+            </a:p>
+          </p:txBody>
+        </p:sp>
+      </p:grpSp>
       <p:pic>
         <p:nvPicPr>
-          <p:cNvPr id="9" name="Picture 8">
-            <a:extLst>
-              <a:ext uri="{FF2B5EF4-FFF2-40B4-BE49-F238E27FC236}">
-                <a16:creationId xmlns:a16="http://schemas.microsoft.com/office/drawing/2014/main" id="{73A9D3D8-62C2-4426-B3E3-30D831333103}"/>
+          <p:cNvPr id="25" name="Picture 24">
+            <a:extLst>
+              <a:ext uri="{FF2B5EF4-FFF2-40B4-BE49-F238E27FC236}">
+                <a16:creationId xmlns:a16="http://schemas.microsoft.com/office/drawing/2014/main" id="{A7F73245-3240-42BF-B3EA-F0730BBB0767}"/>
               </a:ext>
             </a:extLst>
           </p:cNvPr>
@@ -4481,7 +5311,7 @@
         </p:blipFill>
         <p:spPr>
           <a:xfrm>
-            <a:off x="5973233" y="2848009"/>
+            <a:off x="6246629" y="1856069"/>
             <a:ext cx="5299605" cy="3145861"/>
           </a:xfrm>
           <a:prstGeom prst="rect">
@@ -4492,7 +5322,7 @@
     </p:spTree>
     <p:extLst>
       <p:ext uri="{BB962C8B-B14F-4D97-AF65-F5344CB8AC3E}">
-        <p14:creationId xmlns:p14="http://schemas.microsoft.com/office/powerpoint/2010/main" val="3342449845"/>
+        <p14:creationId xmlns:p14="http://schemas.microsoft.com/office/powerpoint/2010/main" val="3046245645"/>
       </p:ext>
     </p:extLst>
   </p:cSld>

</xml_diff>

<commit_message>
Slide-Modified: Register in GitHub.com
</commit_message>
<xml_diff>
--- a/GitTutorial.pptx
+++ b/GitTutorial.pptx
@@ -4112,6 +4112,7 @@
           </a:bodyPr>
           <a:lstStyle/>
           <a:p>
+            <a:pPr algn="ctr"/>
             <a:r>
               <a:rPr lang="en-US" sz="4000" dirty="0"/>
               <a:t>Register in GitHub.com</a:t>
@@ -4120,93 +4121,613 @@
           </a:p>
         </p:txBody>
       </p:sp>
-      <p:sp>
-        <p:nvSpPr>
-          <p:cNvPr id="7" name="Content Placeholder 6">
-            <a:extLst>
-              <a:ext uri="{FF2B5EF4-FFF2-40B4-BE49-F238E27FC236}">
-                <a16:creationId xmlns:a16="http://schemas.microsoft.com/office/drawing/2014/main" id="{451A1A3D-DD99-4EB2-A253-723E5D87D4D0}"/>
-              </a:ext>
-            </a:extLst>
-          </p:cNvPr>
-          <p:cNvSpPr>
-            <a:spLocks noGrp="1"/>
-          </p:cNvSpPr>
-          <p:nvPr>
-            <p:ph idx="1"/>
-          </p:nvPr>
-        </p:nvSpPr>
-        <p:spPr/>
-        <p:txBody>
-          <a:bodyPr/>
-          <a:lstStyle/>
-          <a:p>
-            <a:r>
-              <a:rPr lang="en-US" sz="2800" dirty="0"/>
-              <a:t>Go to </a:t>
-            </a:r>
-            <a:r>
-              <a:rPr lang="en-US" sz="2800" dirty="0">
-                <a:hlinkClick r:id="rId2"/>
-              </a:rPr>
-              <a:t>www.Github.com</a:t>
-            </a:r>
-            <a:r>
-              <a:rPr lang="en-US" sz="2800" dirty="0"/>
-              <a:t> </a:t>
-            </a:r>
-          </a:p>
-          <a:p>
-            <a:r>
-              <a:rPr lang="en-US" sz="2800" dirty="0"/>
-              <a:t>Sign Up </a:t>
-            </a:r>
-          </a:p>
-          <a:p>
-            <a:r>
-              <a:rPr lang="en-US" sz="2800" dirty="0"/>
-              <a:t>Sign in</a:t>
-            </a:r>
-            <a:endParaRPr lang="fa-IR" dirty="0"/>
-          </a:p>
-        </p:txBody>
-      </p:sp>
-      <p:pic>
-        <p:nvPicPr>
-          <p:cNvPr id="9" name="Picture 8">
-            <a:extLst>
-              <a:ext uri="{FF2B5EF4-FFF2-40B4-BE49-F238E27FC236}">
-                <a16:creationId xmlns:a16="http://schemas.microsoft.com/office/drawing/2014/main" id="{24FFDB99-19FB-433C-9B1F-CEF2B3ECD0BD}"/>
-              </a:ext>
-            </a:extLst>
-          </p:cNvPr>
-          <p:cNvPicPr>
-            <a:picLocks noChangeAspect="1"/>
-          </p:cNvPicPr>
+      <p:grpSp>
+        <p:nvGrpSpPr>
+          <p:cNvPr id="14" name="Group 13">
+            <a:extLst>
+              <a:ext uri="{FF2B5EF4-FFF2-40B4-BE49-F238E27FC236}">
+                <a16:creationId xmlns:a16="http://schemas.microsoft.com/office/drawing/2014/main" id="{0246F5A0-4CC1-4812-BA66-3F122D37B26E}"/>
+              </a:ext>
+            </a:extLst>
+          </p:cNvPr>
+          <p:cNvGrpSpPr/>
           <p:nvPr/>
-        </p:nvPicPr>
-        <p:blipFill>
-          <a:blip r:embed="rId3">
-            <a:extLst>
-              <a:ext uri="{28A0092B-C50C-407E-A947-70E740481C1C}">
-                <a14:useLocalDpi xmlns:a14="http://schemas.microsoft.com/office/drawing/2010/main" val="0"/>
-              </a:ext>
-            </a:extLst>
-          </a:blip>
-          <a:stretch>
-            <a:fillRect/>
-          </a:stretch>
-        </p:blipFill>
-        <p:spPr>
+        </p:nvGrpSpPr>
+        <p:grpSpPr>
           <a:xfrm>
-            <a:off x="4650092" y="2438400"/>
-            <a:ext cx="6703708" cy="3580222"/>
+            <a:off x="1664827" y="1964268"/>
+            <a:ext cx="8562905" cy="3262488"/>
+            <a:chOff x="1664827" y="1964268"/>
+            <a:chExt cx="8562905" cy="3262488"/>
           </a:xfrm>
-          <a:prstGeom prst="rect">
-            <a:avLst/>
-          </a:prstGeom>
-        </p:spPr>
-      </p:pic>
+        </p:grpSpPr>
+        <p:sp>
+          <p:nvSpPr>
+            <p:cNvPr id="10" name="Arrow: Right 9">
+              <a:extLst>
+                <a:ext uri="{FF2B5EF4-FFF2-40B4-BE49-F238E27FC236}">
+                  <a16:creationId xmlns:a16="http://schemas.microsoft.com/office/drawing/2014/main" id="{3D1024DC-3712-4392-B41C-4D562EB7994C}"/>
+                </a:ext>
+              </a:extLst>
+            </p:cNvPr>
+            <p:cNvSpPr/>
+            <p:nvPr/>
+          </p:nvSpPr>
+          <p:spPr>
+            <a:xfrm>
+              <a:off x="1664827" y="1964268"/>
+              <a:ext cx="8562905" cy="3262488"/>
+            </a:xfrm>
+            <a:prstGeom prst="rightArrow">
+              <a:avLst/>
+            </a:prstGeom>
+          </p:spPr>
+          <p:style>
+            <a:lnRef idx="0">
+              <a:schemeClr val="accent1">
+                <a:hueOff val="0"/>
+                <a:satOff val="0"/>
+                <a:lumOff val="0"/>
+                <a:alphaOff val="0"/>
+              </a:schemeClr>
+            </a:lnRef>
+            <a:fillRef idx="1">
+              <a:schemeClr val="accent1">
+                <a:tint val="40000"/>
+                <a:hueOff val="0"/>
+                <a:satOff val="0"/>
+                <a:lumOff val="0"/>
+                <a:alphaOff val="0"/>
+              </a:schemeClr>
+            </a:fillRef>
+            <a:effectRef idx="0">
+              <a:schemeClr val="accent1">
+                <a:tint val="40000"/>
+                <a:hueOff val="0"/>
+                <a:satOff val="0"/>
+                <a:lumOff val="0"/>
+                <a:alphaOff val="0"/>
+              </a:schemeClr>
+            </a:effectRef>
+            <a:fontRef idx="minor">
+              <a:schemeClr val="dk1">
+                <a:hueOff val="0"/>
+                <a:satOff val="0"/>
+                <a:lumOff val="0"/>
+                <a:alphaOff val="0"/>
+              </a:schemeClr>
+            </a:fontRef>
+          </p:style>
+        </p:sp>
+        <p:sp>
+          <p:nvSpPr>
+            <p:cNvPr id="11" name="Freeform: Shape 10">
+              <a:extLst>
+                <a:ext uri="{FF2B5EF4-FFF2-40B4-BE49-F238E27FC236}">
+                  <a16:creationId xmlns:a16="http://schemas.microsoft.com/office/drawing/2014/main" id="{763852DA-944F-44CB-88A3-E12796DD5232}"/>
+                </a:ext>
+              </a:extLst>
+            </p:cNvPr>
+            <p:cNvSpPr/>
+            <p:nvPr/>
+          </p:nvSpPr>
+          <p:spPr>
+            <a:xfrm>
+              <a:off x="1964268" y="3096318"/>
+              <a:ext cx="2247694" cy="1015094"/>
+            </a:xfrm>
+            <a:custGeom>
+              <a:avLst/>
+              <a:gdLst>
+                <a:gd name="connsiteX0" fmla="*/ 0 w 2300075"/>
+                <a:gd name="connsiteY0" fmla="*/ 207720 h 1246293"/>
+                <a:gd name="connsiteX1" fmla="*/ 207720 w 2300075"/>
+                <a:gd name="connsiteY1" fmla="*/ 0 h 1246293"/>
+                <a:gd name="connsiteX2" fmla="*/ 2092355 w 2300075"/>
+                <a:gd name="connsiteY2" fmla="*/ 0 h 1246293"/>
+                <a:gd name="connsiteX3" fmla="*/ 2300075 w 2300075"/>
+                <a:gd name="connsiteY3" fmla="*/ 207720 h 1246293"/>
+                <a:gd name="connsiteX4" fmla="*/ 2300075 w 2300075"/>
+                <a:gd name="connsiteY4" fmla="*/ 1038573 h 1246293"/>
+                <a:gd name="connsiteX5" fmla="*/ 2092355 w 2300075"/>
+                <a:gd name="connsiteY5" fmla="*/ 1246293 h 1246293"/>
+                <a:gd name="connsiteX6" fmla="*/ 207720 w 2300075"/>
+                <a:gd name="connsiteY6" fmla="*/ 1246293 h 1246293"/>
+                <a:gd name="connsiteX7" fmla="*/ 0 w 2300075"/>
+                <a:gd name="connsiteY7" fmla="*/ 1038573 h 1246293"/>
+                <a:gd name="connsiteX8" fmla="*/ 0 w 2300075"/>
+                <a:gd name="connsiteY8" fmla="*/ 207720 h 1246293"/>
+              </a:gdLst>
+              <a:ahLst/>
+              <a:cxnLst>
+                <a:cxn ang="0">
+                  <a:pos x="connsiteX0" y="connsiteY0"/>
+                </a:cxn>
+                <a:cxn ang="0">
+                  <a:pos x="connsiteX1" y="connsiteY1"/>
+                </a:cxn>
+                <a:cxn ang="0">
+                  <a:pos x="connsiteX2" y="connsiteY2"/>
+                </a:cxn>
+                <a:cxn ang="0">
+                  <a:pos x="connsiteX3" y="connsiteY3"/>
+                </a:cxn>
+                <a:cxn ang="0">
+                  <a:pos x="connsiteX4" y="connsiteY4"/>
+                </a:cxn>
+                <a:cxn ang="0">
+                  <a:pos x="connsiteX5" y="connsiteY5"/>
+                </a:cxn>
+                <a:cxn ang="0">
+                  <a:pos x="connsiteX6" y="connsiteY6"/>
+                </a:cxn>
+                <a:cxn ang="0">
+                  <a:pos x="connsiteX7" y="connsiteY7"/>
+                </a:cxn>
+                <a:cxn ang="0">
+                  <a:pos x="connsiteX8" y="connsiteY8"/>
+                </a:cxn>
+              </a:cxnLst>
+              <a:rect l="l" t="t" r="r" b="b"/>
+              <a:pathLst>
+                <a:path w="2300075" h="1246293">
+                  <a:moveTo>
+                    <a:pt x="0" y="207720"/>
+                  </a:moveTo>
+                  <a:cubicBezTo>
+                    <a:pt x="0" y="92999"/>
+                    <a:pt x="92999" y="0"/>
+                    <a:pt x="207720" y="0"/>
+                  </a:cubicBezTo>
+                  <a:lnTo>
+                    <a:pt x="2092355" y="0"/>
+                  </a:lnTo>
+                  <a:cubicBezTo>
+                    <a:pt x="2207076" y="0"/>
+                    <a:pt x="2300075" y="92999"/>
+                    <a:pt x="2300075" y="207720"/>
+                  </a:cubicBezTo>
+                  <a:lnTo>
+                    <a:pt x="2300075" y="1038573"/>
+                  </a:lnTo>
+                  <a:cubicBezTo>
+                    <a:pt x="2300075" y="1153294"/>
+                    <a:pt x="2207076" y="1246293"/>
+                    <a:pt x="2092355" y="1246293"/>
+                  </a:cubicBezTo>
+                  <a:lnTo>
+                    <a:pt x="207720" y="1246293"/>
+                  </a:lnTo>
+                  <a:cubicBezTo>
+                    <a:pt x="92999" y="1246293"/>
+                    <a:pt x="0" y="1153294"/>
+                    <a:pt x="0" y="1038573"/>
+                  </a:cubicBezTo>
+                  <a:lnTo>
+                    <a:pt x="0" y="207720"/>
+                  </a:lnTo>
+                  <a:close/>
+                </a:path>
+              </a:pathLst>
+            </a:custGeom>
+          </p:spPr>
+          <p:style>
+            <a:lnRef idx="2">
+              <a:schemeClr val="lt1">
+                <a:hueOff val="0"/>
+                <a:satOff val="0"/>
+                <a:lumOff val="0"/>
+                <a:alphaOff val="0"/>
+              </a:schemeClr>
+            </a:lnRef>
+            <a:fillRef idx="1">
+              <a:schemeClr val="accent1">
+                <a:hueOff val="0"/>
+                <a:satOff val="0"/>
+                <a:lumOff val="0"/>
+                <a:alphaOff val="0"/>
+              </a:schemeClr>
+            </a:fillRef>
+            <a:effectRef idx="0">
+              <a:schemeClr val="accent1">
+                <a:hueOff val="0"/>
+                <a:satOff val="0"/>
+                <a:lumOff val="0"/>
+                <a:alphaOff val="0"/>
+              </a:schemeClr>
+            </a:effectRef>
+            <a:fontRef idx="minor">
+              <a:schemeClr val="lt1"/>
+            </a:fontRef>
+          </p:style>
+          <p:txBody>
+            <a:bodyPr spcFirstLastPara="0" vert="horz" wrap="square" lIns="140849" tIns="140849" rIns="140849" bIns="140849" numCol="1" spcCol="1270" anchor="ctr" anchorCtr="0">
+              <a:noAutofit/>
+            </a:bodyPr>
+            <a:lstStyle/>
+            <a:p>
+              <a:pPr marL="0" lvl="0" indent="0" algn="ctr" defTabSz="933450" rtl="1">
+                <a:lnSpc>
+                  <a:spcPct val="90000"/>
+                </a:lnSpc>
+                <a:spcBef>
+                  <a:spcPct val="0"/>
+                </a:spcBef>
+                <a:spcAft>
+                  <a:spcPct val="35000"/>
+                </a:spcAft>
+                <a:buNone/>
+              </a:pPr>
+              <a:r>
+                <a:rPr lang="en-US" sz="2100" kern="1200" dirty="0"/>
+                <a:t>Go to </a:t>
+              </a:r>
+              <a:r>
+                <a:rPr lang="en-US" sz="2100" kern="1200" dirty="0">
+                  <a:solidFill>
+                    <a:srgbClr val="FFC000"/>
+                  </a:solidFill>
+                  <a:hlinkClick r:id="rId2">
+                    <a:extLst>
+                      <a:ext uri="{A12FA001-AC4F-418D-AE19-62706E023703}">
+                        <ahyp:hlinkClr xmlns:ahyp="http://schemas.microsoft.com/office/drawing/2018/hyperlinkcolor" val="tx"/>
+                      </a:ext>
+                    </a:extLst>
+                  </a:hlinkClick>
+                </a:rPr>
+                <a:t>www.Github.com</a:t>
+              </a:r>
+              <a:r>
+                <a:rPr lang="en-US" sz="2100" kern="1200" dirty="0">
+                  <a:solidFill>
+                    <a:srgbClr val="FFC000"/>
+                  </a:solidFill>
+                </a:rPr>
+                <a:t> </a:t>
+              </a:r>
+              <a:endParaRPr lang="fa-IR" sz="2100" kern="1200" dirty="0">
+                <a:solidFill>
+                  <a:srgbClr val="FFC000"/>
+                </a:solidFill>
+              </a:endParaRPr>
+            </a:p>
+          </p:txBody>
+        </p:sp>
+        <p:sp>
+          <p:nvSpPr>
+            <p:cNvPr id="12" name="Freeform: Shape 11">
+              <a:extLst>
+                <a:ext uri="{FF2B5EF4-FFF2-40B4-BE49-F238E27FC236}">
+                  <a16:creationId xmlns:a16="http://schemas.microsoft.com/office/drawing/2014/main" id="{4AF93A93-B95D-47D9-A507-6296CCEA583C}"/>
+                </a:ext>
+              </a:extLst>
+            </p:cNvPr>
+            <p:cNvSpPr/>
+            <p:nvPr/>
+          </p:nvSpPr>
+          <p:spPr>
+            <a:xfrm>
+              <a:off x="4511403" y="3096318"/>
+              <a:ext cx="2247694" cy="1015094"/>
+            </a:xfrm>
+            <a:custGeom>
+              <a:avLst/>
+              <a:gdLst>
+                <a:gd name="connsiteX0" fmla="*/ 0 w 2300075"/>
+                <a:gd name="connsiteY0" fmla="*/ 207720 h 1246293"/>
+                <a:gd name="connsiteX1" fmla="*/ 207720 w 2300075"/>
+                <a:gd name="connsiteY1" fmla="*/ 0 h 1246293"/>
+                <a:gd name="connsiteX2" fmla="*/ 2092355 w 2300075"/>
+                <a:gd name="connsiteY2" fmla="*/ 0 h 1246293"/>
+                <a:gd name="connsiteX3" fmla="*/ 2300075 w 2300075"/>
+                <a:gd name="connsiteY3" fmla="*/ 207720 h 1246293"/>
+                <a:gd name="connsiteX4" fmla="*/ 2300075 w 2300075"/>
+                <a:gd name="connsiteY4" fmla="*/ 1038573 h 1246293"/>
+                <a:gd name="connsiteX5" fmla="*/ 2092355 w 2300075"/>
+                <a:gd name="connsiteY5" fmla="*/ 1246293 h 1246293"/>
+                <a:gd name="connsiteX6" fmla="*/ 207720 w 2300075"/>
+                <a:gd name="connsiteY6" fmla="*/ 1246293 h 1246293"/>
+                <a:gd name="connsiteX7" fmla="*/ 0 w 2300075"/>
+                <a:gd name="connsiteY7" fmla="*/ 1038573 h 1246293"/>
+                <a:gd name="connsiteX8" fmla="*/ 0 w 2300075"/>
+                <a:gd name="connsiteY8" fmla="*/ 207720 h 1246293"/>
+              </a:gdLst>
+              <a:ahLst/>
+              <a:cxnLst>
+                <a:cxn ang="0">
+                  <a:pos x="connsiteX0" y="connsiteY0"/>
+                </a:cxn>
+                <a:cxn ang="0">
+                  <a:pos x="connsiteX1" y="connsiteY1"/>
+                </a:cxn>
+                <a:cxn ang="0">
+                  <a:pos x="connsiteX2" y="connsiteY2"/>
+                </a:cxn>
+                <a:cxn ang="0">
+                  <a:pos x="connsiteX3" y="connsiteY3"/>
+                </a:cxn>
+                <a:cxn ang="0">
+                  <a:pos x="connsiteX4" y="connsiteY4"/>
+                </a:cxn>
+                <a:cxn ang="0">
+                  <a:pos x="connsiteX5" y="connsiteY5"/>
+                </a:cxn>
+                <a:cxn ang="0">
+                  <a:pos x="connsiteX6" y="connsiteY6"/>
+                </a:cxn>
+                <a:cxn ang="0">
+                  <a:pos x="connsiteX7" y="connsiteY7"/>
+                </a:cxn>
+                <a:cxn ang="0">
+                  <a:pos x="connsiteX8" y="connsiteY8"/>
+                </a:cxn>
+              </a:cxnLst>
+              <a:rect l="l" t="t" r="r" b="b"/>
+              <a:pathLst>
+                <a:path w="2300075" h="1246293">
+                  <a:moveTo>
+                    <a:pt x="0" y="207720"/>
+                  </a:moveTo>
+                  <a:cubicBezTo>
+                    <a:pt x="0" y="92999"/>
+                    <a:pt x="92999" y="0"/>
+                    <a:pt x="207720" y="0"/>
+                  </a:cubicBezTo>
+                  <a:lnTo>
+                    <a:pt x="2092355" y="0"/>
+                  </a:lnTo>
+                  <a:cubicBezTo>
+                    <a:pt x="2207076" y="0"/>
+                    <a:pt x="2300075" y="92999"/>
+                    <a:pt x="2300075" y="207720"/>
+                  </a:cubicBezTo>
+                  <a:lnTo>
+                    <a:pt x="2300075" y="1038573"/>
+                  </a:lnTo>
+                  <a:cubicBezTo>
+                    <a:pt x="2300075" y="1153294"/>
+                    <a:pt x="2207076" y="1246293"/>
+                    <a:pt x="2092355" y="1246293"/>
+                  </a:cubicBezTo>
+                  <a:lnTo>
+                    <a:pt x="207720" y="1246293"/>
+                  </a:lnTo>
+                  <a:cubicBezTo>
+                    <a:pt x="92999" y="1246293"/>
+                    <a:pt x="0" y="1153294"/>
+                    <a:pt x="0" y="1038573"/>
+                  </a:cubicBezTo>
+                  <a:lnTo>
+                    <a:pt x="0" y="207720"/>
+                  </a:lnTo>
+                  <a:close/>
+                </a:path>
+              </a:pathLst>
+            </a:custGeom>
+          </p:spPr>
+          <p:style>
+            <a:lnRef idx="2">
+              <a:schemeClr val="lt1">
+                <a:hueOff val="0"/>
+                <a:satOff val="0"/>
+                <a:lumOff val="0"/>
+                <a:alphaOff val="0"/>
+              </a:schemeClr>
+            </a:lnRef>
+            <a:fillRef idx="1">
+              <a:schemeClr val="accent1">
+                <a:hueOff val="0"/>
+                <a:satOff val="0"/>
+                <a:lumOff val="0"/>
+                <a:alphaOff val="0"/>
+              </a:schemeClr>
+            </a:fillRef>
+            <a:effectRef idx="0">
+              <a:schemeClr val="accent1">
+                <a:hueOff val="0"/>
+                <a:satOff val="0"/>
+                <a:lumOff val="0"/>
+                <a:alphaOff val="0"/>
+              </a:schemeClr>
+            </a:effectRef>
+            <a:fontRef idx="minor">
+              <a:schemeClr val="lt1"/>
+            </a:fontRef>
+          </p:style>
+          <p:txBody>
+            <a:bodyPr spcFirstLastPara="0" vert="horz" wrap="square" lIns="140849" tIns="140849" rIns="140849" bIns="140849" numCol="1" spcCol="1270" anchor="ctr" anchorCtr="0">
+              <a:noAutofit/>
+            </a:bodyPr>
+            <a:lstStyle/>
+            <a:p>
+              <a:pPr marL="0" lvl="0" indent="0" algn="ctr" defTabSz="933450" rtl="1">
+                <a:lnSpc>
+                  <a:spcPct val="90000"/>
+                </a:lnSpc>
+                <a:spcBef>
+                  <a:spcPct val="0"/>
+                </a:spcBef>
+                <a:spcAft>
+                  <a:spcPct val="35000"/>
+                </a:spcAft>
+                <a:buNone/>
+              </a:pPr>
+              <a:r>
+                <a:rPr lang="en-US" sz="2100" kern="1200"/>
+                <a:t>Sign Up </a:t>
+              </a:r>
+              <a:endParaRPr lang="fa-IR" sz="2100" kern="1200"/>
+            </a:p>
+          </p:txBody>
+        </p:sp>
+        <p:sp>
+          <p:nvSpPr>
+            <p:cNvPr id="13" name="Freeform: Shape 12">
+              <a:extLst>
+                <a:ext uri="{FF2B5EF4-FFF2-40B4-BE49-F238E27FC236}">
+                  <a16:creationId xmlns:a16="http://schemas.microsoft.com/office/drawing/2014/main" id="{4D98F471-1FA0-4B05-BC28-01C87E4A9AB8}"/>
+                </a:ext>
+              </a:extLst>
+            </p:cNvPr>
+            <p:cNvSpPr/>
+            <p:nvPr/>
+          </p:nvSpPr>
+          <p:spPr>
+            <a:xfrm>
+              <a:off x="7031773" y="3096318"/>
+              <a:ext cx="2247694" cy="1015094"/>
+            </a:xfrm>
+            <a:custGeom>
+              <a:avLst/>
+              <a:gdLst>
+                <a:gd name="connsiteX0" fmla="*/ 0 w 2300075"/>
+                <a:gd name="connsiteY0" fmla="*/ 207720 h 1246293"/>
+                <a:gd name="connsiteX1" fmla="*/ 207720 w 2300075"/>
+                <a:gd name="connsiteY1" fmla="*/ 0 h 1246293"/>
+                <a:gd name="connsiteX2" fmla="*/ 2092355 w 2300075"/>
+                <a:gd name="connsiteY2" fmla="*/ 0 h 1246293"/>
+                <a:gd name="connsiteX3" fmla="*/ 2300075 w 2300075"/>
+                <a:gd name="connsiteY3" fmla="*/ 207720 h 1246293"/>
+                <a:gd name="connsiteX4" fmla="*/ 2300075 w 2300075"/>
+                <a:gd name="connsiteY4" fmla="*/ 1038573 h 1246293"/>
+                <a:gd name="connsiteX5" fmla="*/ 2092355 w 2300075"/>
+                <a:gd name="connsiteY5" fmla="*/ 1246293 h 1246293"/>
+                <a:gd name="connsiteX6" fmla="*/ 207720 w 2300075"/>
+                <a:gd name="connsiteY6" fmla="*/ 1246293 h 1246293"/>
+                <a:gd name="connsiteX7" fmla="*/ 0 w 2300075"/>
+                <a:gd name="connsiteY7" fmla="*/ 1038573 h 1246293"/>
+                <a:gd name="connsiteX8" fmla="*/ 0 w 2300075"/>
+                <a:gd name="connsiteY8" fmla="*/ 207720 h 1246293"/>
+              </a:gdLst>
+              <a:ahLst/>
+              <a:cxnLst>
+                <a:cxn ang="0">
+                  <a:pos x="connsiteX0" y="connsiteY0"/>
+                </a:cxn>
+                <a:cxn ang="0">
+                  <a:pos x="connsiteX1" y="connsiteY1"/>
+                </a:cxn>
+                <a:cxn ang="0">
+                  <a:pos x="connsiteX2" y="connsiteY2"/>
+                </a:cxn>
+                <a:cxn ang="0">
+                  <a:pos x="connsiteX3" y="connsiteY3"/>
+                </a:cxn>
+                <a:cxn ang="0">
+                  <a:pos x="connsiteX4" y="connsiteY4"/>
+                </a:cxn>
+                <a:cxn ang="0">
+                  <a:pos x="connsiteX5" y="connsiteY5"/>
+                </a:cxn>
+                <a:cxn ang="0">
+                  <a:pos x="connsiteX6" y="connsiteY6"/>
+                </a:cxn>
+                <a:cxn ang="0">
+                  <a:pos x="connsiteX7" y="connsiteY7"/>
+                </a:cxn>
+                <a:cxn ang="0">
+                  <a:pos x="connsiteX8" y="connsiteY8"/>
+                </a:cxn>
+              </a:cxnLst>
+              <a:rect l="l" t="t" r="r" b="b"/>
+              <a:pathLst>
+                <a:path w="2300075" h="1246293">
+                  <a:moveTo>
+                    <a:pt x="0" y="207720"/>
+                  </a:moveTo>
+                  <a:cubicBezTo>
+                    <a:pt x="0" y="92999"/>
+                    <a:pt x="92999" y="0"/>
+                    <a:pt x="207720" y="0"/>
+                  </a:cubicBezTo>
+                  <a:lnTo>
+                    <a:pt x="2092355" y="0"/>
+                  </a:lnTo>
+                  <a:cubicBezTo>
+                    <a:pt x="2207076" y="0"/>
+                    <a:pt x="2300075" y="92999"/>
+                    <a:pt x="2300075" y="207720"/>
+                  </a:cubicBezTo>
+                  <a:lnTo>
+                    <a:pt x="2300075" y="1038573"/>
+                  </a:lnTo>
+                  <a:cubicBezTo>
+                    <a:pt x="2300075" y="1153294"/>
+                    <a:pt x="2207076" y="1246293"/>
+                    <a:pt x="2092355" y="1246293"/>
+                  </a:cubicBezTo>
+                  <a:lnTo>
+                    <a:pt x="207720" y="1246293"/>
+                  </a:lnTo>
+                  <a:cubicBezTo>
+                    <a:pt x="92999" y="1246293"/>
+                    <a:pt x="0" y="1153294"/>
+                    <a:pt x="0" y="1038573"/>
+                  </a:cubicBezTo>
+                  <a:lnTo>
+                    <a:pt x="0" y="207720"/>
+                  </a:lnTo>
+                  <a:close/>
+                </a:path>
+              </a:pathLst>
+            </a:custGeom>
+          </p:spPr>
+          <p:style>
+            <a:lnRef idx="2">
+              <a:schemeClr val="lt1">
+                <a:hueOff val="0"/>
+                <a:satOff val="0"/>
+                <a:lumOff val="0"/>
+                <a:alphaOff val="0"/>
+              </a:schemeClr>
+            </a:lnRef>
+            <a:fillRef idx="1">
+              <a:schemeClr val="accent1">
+                <a:hueOff val="0"/>
+                <a:satOff val="0"/>
+                <a:lumOff val="0"/>
+                <a:alphaOff val="0"/>
+              </a:schemeClr>
+            </a:fillRef>
+            <a:effectRef idx="0">
+              <a:schemeClr val="accent1">
+                <a:hueOff val="0"/>
+                <a:satOff val="0"/>
+                <a:lumOff val="0"/>
+                <a:alphaOff val="0"/>
+              </a:schemeClr>
+            </a:effectRef>
+            <a:fontRef idx="minor">
+              <a:schemeClr val="lt1"/>
+            </a:fontRef>
+          </p:style>
+          <p:txBody>
+            <a:bodyPr spcFirstLastPara="0" vert="horz" wrap="square" lIns="140849" tIns="140849" rIns="140849" bIns="140849" numCol="1" spcCol="1270" anchor="ctr" anchorCtr="0">
+              <a:noAutofit/>
+            </a:bodyPr>
+            <a:lstStyle/>
+            <a:p>
+              <a:pPr marL="0" lvl="0" indent="0" algn="ctr" defTabSz="933450" rtl="1">
+                <a:lnSpc>
+                  <a:spcPct val="90000"/>
+                </a:lnSpc>
+                <a:spcBef>
+                  <a:spcPct val="0"/>
+                </a:spcBef>
+                <a:spcAft>
+                  <a:spcPct val="35000"/>
+                </a:spcAft>
+                <a:buNone/>
+              </a:pPr>
+              <a:r>
+                <a:rPr lang="en-US" sz="2100" kern="1200"/>
+                <a:t>Sign in</a:t>
+              </a:r>
+              <a:endParaRPr lang="fa-IR" sz="2100" kern="1200"/>
+            </a:p>
+          </p:txBody>
+        </p:sp>
+      </p:grpSp>
     </p:spTree>
     <p:extLst>
       <p:ext uri="{BB962C8B-B14F-4D97-AF65-F5344CB8AC3E}">

</xml_diff>

<commit_message>
Changing the default editor to notepad2
</commit_message>
<xml_diff>
--- a/GitTutorial.pptx
+++ b/GitTutorial.pptx
@@ -1909,7 +1909,7 @@
             <a:buNone/>
           </a:pPr>
           <a:r>
-            <a:rPr lang="en-US"/>
+            <a:rPr lang="en-US" dirty="0"/>
             <a:t>To set your default editor to notepad</a:t>
           </a:r>
           <a:endParaRPr lang="fa-IR" dirty="0"/>
@@ -2701,7 +2701,7 @@
             <a:buNone/>
           </a:pPr>
           <a:r>
-            <a:rPr lang="en-US" sz="1100" kern="1200"/>
+            <a:rPr lang="en-US" sz="1100" kern="1200" dirty="0"/>
             <a:t>To set your default editor to notepad</a:t>
           </a:r>
           <a:endParaRPr lang="fa-IR" sz="1100" kern="1200" dirty="0"/>
@@ -9551,7 +9551,7 @@
         </p:blipFill>
         <p:spPr>
           <a:xfrm>
-            <a:off x="3619500" y="4103798"/>
+            <a:off x="3619500" y="3753843"/>
             <a:ext cx="4953000" cy="1743075"/>
           </a:xfrm>
           <a:prstGeom prst="rect">

</xml_diff>